<commit_message>
minor changes to presentation (typos)
</commit_message>
<xml_diff>
--- a/paper/presentation/Haller.Heithoff.Sezer_Slides_First-Draft.pptx
+++ b/paper/presentation/Haller.Heithoff.Sezer_Slides_First-Draft.pptx
@@ -13830,7 +13830,7 @@
               <a:buFont typeface="Noto Sans Symbols"/>
               <a:buNone/>
             </a:pPr>
-            <a:endParaRPr sz="2000" b="0" i="0" u="none" strike="noStrike" cap="none">
+            <a:endParaRPr sz="2000" b="0" i="0" u="none" strike="noStrike" cap="none" dirty="0">
               <a:solidFill>
                 <a:schemeClr val="dk1"/>
               </a:solidFill>
@@ -16214,7 +16214,7 @@
             </a:r>
             <a:r>
               <a:rPr lang="de-DE" dirty="0"/>
-              <a:t> DIE</a:t>
+              <a:t> IDE</a:t>
             </a:r>
           </a:p>
           <a:p>

</xml_diff>